<commit_message>
uploading syllabus and cpp expressions ppt
</commit_message>
<xml_diff>
--- a/2.experssions/understanding expressions-python.pptx
+++ b/2.experssions/understanding expressions-python.pptx
@@ -4245,13 +4245,13 @@
             <p:ph idx="1"/>
             <p:extLst>
               <p:ext uri="{D42A27DB-BD31-4B8C-83A1-F6EECF244321}">
-                <p14:modId xmlns:p14="http://schemas.microsoft.com/office/powerpoint/2010/main" val="3270319131"/>
+                <p14:modId xmlns:p14="http://schemas.microsoft.com/office/powerpoint/2010/main" val="3616684219"/>
               </p:ext>
             </p:extLst>
           </p:nvPr>
         </p:nvGraphicFramePr>
         <p:xfrm>
-          <a:off x="457200" y="1371600"/>
+          <a:off x="533400" y="1121888"/>
           <a:ext cx="8153400" cy="1422400"/>
         </p:xfrm>
         <a:graphic>
@@ -4340,60 +4340,6 @@
           </a:graphicData>
         </a:graphic>
       </p:graphicFrame>
-      <p:pic>
-        <p:nvPicPr>
-          <p:cNvPr id="1026" name="Picture 2"/>
-          <p:cNvPicPr>
-            <a:picLocks noChangeAspect="1" noChangeArrowheads="1"/>
-          </p:cNvPicPr>
-          <p:nvPr/>
-        </p:nvPicPr>
-        <p:blipFill>
-          <a:blip r:embed="rId2">
-            <a:extLst>
-              <a:ext uri="{28A0092B-C50C-407E-A947-70E740481C1C}">
-                <a14:useLocalDpi xmlns:a14="http://schemas.microsoft.com/office/drawing/2010/main" val="0"/>
-              </a:ext>
-            </a:extLst>
-          </a:blip>
-          <a:srcRect/>
-          <a:stretch>
-            <a:fillRect/>
-          </a:stretch>
-        </p:blipFill>
-        <p:spPr bwMode="auto">
-          <a:xfrm>
-            <a:off x="1447800" y="3249769"/>
-            <a:ext cx="6974679" cy="3143517"/>
-          </a:xfrm>
-          <a:prstGeom prst="rect">
-            <a:avLst/>
-          </a:prstGeom>
-          <a:noFill/>
-          <a:ln>
-            <a:noFill/>
-          </a:ln>
-          <a:extLst>
-            <a:ext uri="{909E8E84-426E-40DD-AFC4-6F175D3DCCD1}">
-              <a14:hiddenFill xmlns:a14="http://schemas.microsoft.com/office/drawing/2010/main">
-                <a:solidFill>
-                  <a:schemeClr val="accent1"/>
-                </a:solidFill>
-              </a14:hiddenFill>
-            </a:ext>
-            <a:ext uri="{91240B29-F687-4F45-9708-019B960494DF}">
-              <a14:hiddenLine xmlns:a14="http://schemas.microsoft.com/office/drawing/2010/main" w="9525">
-                <a:solidFill>
-                  <a:schemeClr val="tx1"/>
-                </a:solidFill>
-                <a:miter lim="800000"/>
-                <a:headEnd/>
-                <a:tailEnd/>
-              </a14:hiddenLine>
-            </a:ext>
-          </a:extLst>
-        </p:spPr>
-      </p:pic>
       <p:cxnSp>
         <p:nvCxnSpPr>
           <p:cNvPr id="5" name="Straight Arrow Connector 4"/>
@@ -4402,8 +4348,8 @@
         </p:nvCxnSpPr>
         <p:spPr>
           <a:xfrm flipH="1">
-            <a:off x="6400800" y="2514600"/>
-            <a:ext cx="152400" cy="838200"/>
+            <a:off x="7086600" y="2209800"/>
+            <a:ext cx="609600" cy="838200"/>
           </a:xfrm>
           <a:prstGeom prst="straightConnector1">
             <a:avLst/>
@@ -4427,6 +4373,47 @@
           </a:fontRef>
         </p:style>
       </p:cxnSp>
+      <p:pic>
+        <p:nvPicPr>
+          <p:cNvPr id="6" name="Picture 2" descr="Operator Precedence and Associativity in Python"/>
+          <p:cNvPicPr>
+            <a:picLocks noChangeAspect="1" noChangeArrowheads="1"/>
+          </p:cNvPicPr>
+          <p:nvPr/>
+        </p:nvPicPr>
+        <p:blipFill>
+          <a:blip r:embed="rId2">
+            <a:extLst>
+              <a:ext uri="{28A0092B-C50C-407E-A947-70E740481C1C}">
+                <a14:useLocalDpi xmlns:a14="http://schemas.microsoft.com/office/drawing/2010/main" val="0"/>
+              </a:ext>
+            </a:extLst>
+          </a:blip>
+          <a:srcRect/>
+          <a:stretch>
+            <a:fillRect/>
+          </a:stretch>
+        </p:blipFill>
+        <p:spPr bwMode="auto">
+          <a:xfrm>
+            <a:off x="1371600" y="2514600"/>
+            <a:ext cx="5438775" cy="4267199"/>
+          </a:xfrm>
+          <a:prstGeom prst="rect">
+            <a:avLst/>
+          </a:prstGeom>
+          <a:noFill/>
+          <a:extLst>
+            <a:ext uri="{909E8E84-426E-40DD-AFC4-6F175D3DCCD1}">
+              <a14:hiddenFill xmlns:a14="http://schemas.microsoft.com/office/drawing/2010/main">
+                <a:solidFill>
+                  <a:srgbClr val="FFFFFF"/>
+                </a:solidFill>
+              </a14:hiddenFill>
+            </a:ext>
+          </a:extLst>
+        </p:spPr>
+      </p:pic>
     </p:spTree>
     <p:extLst>
       <p:ext uri="{BB962C8B-B14F-4D97-AF65-F5344CB8AC3E}">

</xml_diff>